<commit_message>
rename Platform > VEE Port and Firmware > Executable in the overview
</commit_message>
<xml_diff>
--- a/overview/images/toolchain.pptx
+++ b/overview/images/toolchain.pptx
@@ -229,7 +229,7 @@
               <a:rPr lang="fr-FR" smtClean="0">
                 <a:latin typeface="Calibri Regular" charset="0"/>
               </a:rPr>
-              <a:t>septembre 21</a:t>
+              <a:t>novembre 22</a:t>
             </a:fld>
             <a:endParaRPr lang="en-US" dirty="0">
               <a:latin typeface="Calibri Regular" charset="0"/>
@@ -408,7 +408,7 @@
             <a:fld id="{79958FA1-9FE8-F149-AB4B-7DC9950B39E9}" type="datetime6">
               <a:rPr lang="fr-FR" smtClean="0"/>
               <a:pPr/>
-              <a:t>septembre 21</a:t>
+              <a:t>novembre 22</a:t>
             </a:fld>
             <a:endParaRPr lang="en-US" dirty="0"/>
           </a:p>
@@ -1163,7 +1163,7 @@
           <a:p>
             <a:fld id="{7E8DAAE0-7A9E-9F46-B84D-C44AC8DB25A2}" type="datetime6">
               <a:rPr lang="fr-FR" smtClean="0"/>
-              <a:t>septembre 21</a:t>
+              <a:t>novembre 22</a:t>
             </a:fld>
             <a:endParaRPr lang="en-US" dirty="0"/>
           </a:p>
@@ -1313,7 +1313,7 @@
           <a:p>
             <a:fld id="{F9582307-04DB-2F4D-BDB0-614E4902BA9E}" type="datetime6">
               <a:rPr lang="fr-FR" smtClean="0"/>
-              <a:t>septembre 21</a:t>
+              <a:t>novembre 22</a:t>
             </a:fld>
             <a:endParaRPr lang="en-US" dirty="0"/>
           </a:p>
@@ -1459,7 +1459,7 @@
           <a:p>
             <a:fld id="{180A4ADF-D2E2-C44F-9BED-DE909ECFAA4C}" type="datetime6">
               <a:rPr lang="fr-FR" smtClean="0"/>
-              <a:t>septembre 21</a:t>
+              <a:t>novembre 22</a:t>
             </a:fld>
             <a:endParaRPr lang="en-US" dirty="0"/>
           </a:p>
@@ -1660,7 +1660,7 @@
             <a:fld id="{22DD8F49-BF83-0E4D-8954-2DA98C3220A2}" type="datetime6">
               <a:rPr lang="fr-FR" smtClean="0"/>
               <a:pPr/>
-              <a:t>septembre 21</a:t>
+              <a:t>novembre 22</a:t>
             </a:fld>
             <a:endParaRPr lang="en-US" dirty="0"/>
           </a:p>
@@ -2609,7 +2609,7 @@
           <a:p>
             <a:fld id="{CFBFD163-B769-8340-9BFA-850DE925A786}" type="datetime6">
               <a:rPr lang="fr-FR" smtClean="0"/>
-              <a:t>septembre 21</a:t>
+              <a:t>novembre 22</a:t>
             </a:fld>
             <a:endParaRPr lang="en-US" dirty="0"/>
           </a:p>
@@ -2709,7 +2709,7 @@
           <a:p>
             <a:fld id="{D6DDDD81-934D-2440-96D5-710E55CF1726}" type="datetime6">
               <a:rPr lang="fr-FR" smtClean="0"/>
-              <a:t>septembre 21</a:t>
+              <a:t>novembre 22</a:t>
             </a:fld>
             <a:endParaRPr lang="en-US" dirty="0"/>
           </a:p>
@@ -3375,7 +3375,7 @@
           <a:p>
             <a:fld id="{9FC060DB-6E52-EB46-96C1-740CFB82B988}" type="datetime6">
               <a:rPr lang="fr-FR" smtClean="0"/>
-              <a:t>septembre 21</a:t>
+              <a:t>novembre 22</a:t>
             </a:fld>
             <a:endParaRPr lang="en-US" dirty="0"/>
           </a:p>
@@ -3516,7 +3516,7 @@
           <a:p>
             <a:fld id="{DF677A4E-A05D-044B-B606-EB8FC4116036}" type="datetime6">
               <a:rPr lang="fr-FR" smtClean="0"/>
-              <a:t>septembre 21</a:t>
+              <a:t>novembre 22</a:t>
             </a:fld>
             <a:endParaRPr lang="en-US" dirty="0"/>
           </a:p>
@@ -3791,7 +3791,7 @@
             <a:fld id="{22DD8F49-BF83-0E4D-8954-2DA98C3220A2}" type="datetime6">
               <a:rPr lang="fr-FR" smtClean="0"/>
               <a:pPr/>
-              <a:t>septembre 21</a:t>
+              <a:t>novembre 22</a:t>
             </a:fld>
             <a:endParaRPr lang="en-US" dirty="0"/>
           </a:p>
@@ -4314,7 +4314,7 @@
           <p:cNvPr id="77" name="Rounded Rectangle 62">
             <a:extLst>
               <a:ext uri="{FF2B5EF4-FFF2-40B4-BE49-F238E27FC236}">
-                <a16:creationId xmlns:a16="http://schemas.microsoft.com/office/drawing/2014/main" id="{FFBC32F8-7FE7-4F44-AAED-4DC038ED8849}"/>
+                <a16:creationId xmlns:a16="http://schemas.microsoft.com/office/drawing/2014/main" xmlns="" id="{FFBC32F8-7FE7-4F44-AAED-4DC038ED8849}"/>
               </a:ext>
             </a:extLst>
           </p:cNvPr>
@@ -4380,7 +4380,7 @@
         <p:spPr>
           <a:xfrm>
             <a:off x="2207568" y="2194314"/>
-            <a:ext cx="1986755" cy="307777"/>
+            <a:ext cx="2218249" cy="307777"/>
           </a:xfrm>
           <a:prstGeom prst="rect">
             <a:avLst/>
@@ -4394,12 +4394,12 @@
           <a:lstStyle/>
           <a:p>
             <a:r>
-              <a:rPr lang="en-US" sz="1400">
+              <a:rPr lang="en-US" sz="1400" dirty="0" smtClean="0">
                 <a:latin typeface="Source Sans Pro" charset="0"/>
                 <a:ea typeface="Source Sans Pro" charset="0"/>
                 <a:cs typeface="Source Sans Pro" charset="0"/>
               </a:rPr>
-              <a:t>Firmware Development</a:t>
+              <a:t>Executable Development</a:t>
             </a:r>
             <a:endParaRPr lang="en-US" sz="1400" dirty="0">
               <a:latin typeface="Source Sans Pro" charset="0"/>
@@ -4417,7 +4417,7 @@
         </p:nvGrpSpPr>
         <p:grpSpPr>
           <a:xfrm>
-            <a:off x="2110803" y="1091258"/>
+            <a:off x="1991544" y="1091258"/>
             <a:ext cx="985498" cy="985496"/>
             <a:chOff x="2234291" y="806998"/>
             <a:chExt cx="985498" cy="985496"/>
@@ -4495,13 +4495,18 @@
             <a:p>
               <a:pPr algn="ctr"/>
               <a:r>
-                <a:rPr lang="en-US" sz="1600" dirty="0">
+                <a:rPr lang="en-US" sz="1600" dirty="0" smtClean="0">
                   <a:latin typeface="Source Sans Pro" charset="0"/>
                   <a:ea typeface="Source Sans Pro" charset="0"/>
                   <a:cs typeface="Source Sans Pro" charset="0"/>
                 </a:rPr>
-                <a:t>Platform</a:t>
+                <a:t>VEE Port</a:t>
               </a:r>
+              <a:endParaRPr lang="en-US" sz="1600" dirty="0">
+                <a:latin typeface="Source Sans Pro" charset="0"/>
+                <a:ea typeface="Source Sans Pro" charset="0"/>
+                <a:cs typeface="Source Sans Pro" charset="0"/>
+              </a:endParaRPr>
             </a:p>
           </p:txBody>
         </p:sp>
@@ -4514,10 +4519,10 @@
         </p:nvGrpSpPr>
         <p:grpSpPr>
           <a:xfrm>
-            <a:off x="3278342" y="1091258"/>
-            <a:ext cx="1017400" cy="985496"/>
+            <a:off x="3131653" y="1091258"/>
+            <a:ext cx="1294163" cy="1416760"/>
             <a:chOff x="3401830" y="806998"/>
-            <a:chExt cx="1017400" cy="985496"/>
+            <a:chExt cx="1017400" cy="1416760"/>
           </a:xfrm>
         </p:grpSpPr>
         <p:sp>
@@ -4576,8 +4581,8 @@
           </p:nvSpPr>
           <p:spPr>
             <a:xfrm>
-              <a:off x="3401830" y="1013429"/>
-              <a:ext cx="1017400" cy="584775"/>
+              <a:off x="3401830" y="900319"/>
+              <a:ext cx="1017400" cy="1323439"/>
             </a:xfrm>
             <a:prstGeom prst="rect">
               <a:avLst/>
@@ -4592,13 +4597,29 @@
             <a:p>
               <a:pPr algn="ctr"/>
               <a:r>
-                <a:rPr lang="en-US" sz="1600" dirty="0">
+                <a:rPr lang="en-US" sz="1600" dirty="0" smtClean="0">
                   <a:latin typeface="Source Sans Pro" charset="0"/>
                   <a:ea typeface="Source Sans Pro" charset="0"/>
                   <a:cs typeface="Source Sans Pro" charset="0"/>
                 </a:rPr>
-                <a:t>Firmware</a:t>
+                <a:t>Standalone</a:t>
               </a:r>
+            </a:p>
+            <a:p>
+              <a:pPr algn="ctr"/>
+              <a:r>
+                <a:rPr lang="en-US" sz="1600" dirty="0" smtClean="0">
+                  <a:latin typeface="Source Sans Pro" charset="0"/>
+                  <a:ea typeface="Source Sans Pro" charset="0"/>
+                  <a:cs typeface="Source Sans Pro" charset="0"/>
+                </a:rPr>
+                <a:t>Application</a:t>
+              </a:r>
+              <a:endParaRPr lang="en-US" sz="1600" dirty="0">
+                <a:latin typeface="Source Sans Pro" charset="0"/>
+                <a:ea typeface="Source Sans Pro" charset="0"/>
+                <a:cs typeface="Source Sans Pro" charset="0"/>
+              </a:endParaRPr>
             </a:p>
             <a:p>
               <a:pPr algn="ctr"/>
@@ -4623,7 +4644,7 @@
         <p:spPr>
           <a:xfrm>
             <a:off x="2234292" y="3189259"/>
-            <a:ext cx="986733" cy="986733"/>
+            <a:ext cx="1044049" cy="986733"/>
           </a:xfrm>
           <a:prstGeom prst="foldedCorner">
             <a:avLst/>
@@ -4841,8 +4862,8 @@
         </p:nvSpPr>
         <p:spPr>
           <a:xfrm>
-            <a:off x="2238909" y="4704633"/>
-            <a:ext cx="986733" cy="986733"/>
+            <a:off x="2207568" y="4704633"/>
+            <a:ext cx="1081327" cy="986733"/>
           </a:xfrm>
           <a:prstGeom prst="foldedCorner">
             <a:avLst/>
@@ -4889,8 +4910,8 @@
         </p:nvSpPr>
         <p:spPr>
           <a:xfrm>
-            <a:off x="2196655" y="5009306"/>
-            <a:ext cx="1077830" cy="338554"/>
+            <a:off x="2196654" y="5009306"/>
+            <a:ext cx="1144877" cy="338554"/>
           </a:xfrm>
           <a:prstGeom prst="rect">
             <a:avLst/>
@@ -4905,13 +4926,18 @@
           <a:p>
             <a:pPr algn="ctr"/>
             <a:r>
-              <a:rPr lang="en-US" sz="1600" dirty="0">
+              <a:rPr lang="en-US" sz="1600" dirty="0" smtClean="0">
                 <a:latin typeface="Source Sans Pro" charset="0"/>
                 <a:ea typeface="Source Sans Pro" charset="0"/>
                 <a:cs typeface="Source Sans Pro" charset="0"/>
               </a:rPr>
-              <a:t>Firmware</a:t>
-            </a:r>
+              <a:t>Executable</a:t>
+            </a:r>
+            <a:endParaRPr lang="en-US" sz="1600" dirty="0">
+              <a:latin typeface="Source Sans Pro" charset="0"/>
+              <a:ea typeface="Source Sans Pro" charset="0"/>
+              <a:cs typeface="Source Sans Pro" charset="0"/>
+            </a:endParaRPr>
           </a:p>
         </p:txBody>
       </p:sp>
@@ -5133,8 +5159,8 @@
         </p:nvSpPr>
         <p:spPr>
           <a:xfrm>
-            <a:off x="3378502" y="5287403"/>
-            <a:ext cx="696024" cy="325602"/>
+            <a:off x="3378503" y="5287403"/>
+            <a:ext cx="696024" cy="323165"/>
           </a:xfrm>
           <a:prstGeom prst="rect">
             <a:avLst/>
@@ -5159,7 +5185,7 @@
               </a:spcAft>
             </a:pPr>
             <a:r>
-              <a:rPr lang="en-US" dirty="0">
+              <a:rPr lang="en-US" dirty="0" smtClean="0">
                 <a:solidFill>
                   <a:schemeClr val="accent2"/>
                 </a:solidFill>
@@ -5169,6 +5195,14 @@
               </a:rPr>
               <a:t>Flash</a:t>
             </a:r>
+            <a:endParaRPr lang="en-US" dirty="0">
+              <a:solidFill>
+                <a:schemeClr val="accent2"/>
+              </a:solidFill>
+              <a:latin typeface="Source Sans Pro" charset="0"/>
+              <a:ea typeface="Source Sans Pro" charset="0"/>
+              <a:cs typeface="Source Sans Pro" charset="0"/>
+            </a:endParaRPr>
           </a:p>
         </p:txBody>
       </p:sp>
@@ -5975,7 +6009,7 @@
           <p:cNvPr id="65" name="Rounded Rectangle 62">
             <a:extLst>
               <a:ext uri="{FF2B5EF4-FFF2-40B4-BE49-F238E27FC236}">
-                <a16:creationId xmlns:a16="http://schemas.microsoft.com/office/drawing/2014/main" id="{5498B47D-4673-4821-8A44-FD61DE0C0A54}"/>
+                <a16:creationId xmlns:a16="http://schemas.microsoft.com/office/drawing/2014/main" xmlns="" id="{5498B47D-4673-4821-8A44-FD61DE0C0A54}"/>
               </a:ext>
             </a:extLst>
           </p:cNvPr>
@@ -6037,7 +6071,7 @@
           <p:cNvPr id="66" name="TextBox 65">
             <a:extLst>
               <a:ext uri="{FF2B5EF4-FFF2-40B4-BE49-F238E27FC236}">
-                <a16:creationId xmlns:a16="http://schemas.microsoft.com/office/drawing/2014/main" id="{8DFD6733-8CA8-43B8-9F18-100107C30CB6}"/>
+                <a16:creationId xmlns:a16="http://schemas.microsoft.com/office/drawing/2014/main" xmlns="" id="{8DFD6733-8CA8-43B8-9F18-100107C30CB6}"/>
               </a:ext>
             </a:extLst>
           </p:cNvPr>
@@ -6081,7 +6115,7 @@
           <p:cNvPr id="74" name="Group 73">
             <a:extLst>
               <a:ext uri="{FF2B5EF4-FFF2-40B4-BE49-F238E27FC236}">
-                <a16:creationId xmlns:a16="http://schemas.microsoft.com/office/drawing/2014/main" id="{7FF33F19-9888-4F66-BE4C-C751E266E174}"/>
+                <a16:creationId xmlns:a16="http://schemas.microsoft.com/office/drawing/2014/main" xmlns="" id="{7FF33F19-9888-4F66-BE4C-C751E266E174}"/>
               </a:ext>
             </a:extLst>
           </p:cNvPr>
@@ -6101,7 +6135,7 @@
             <p:cNvPr id="75" name="Picture 74">
               <a:extLst>
                 <a:ext uri="{FF2B5EF4-FFF2-40B4-BE49-F238E27FC236}">
-                  <a16:creationId xmlns:a16="http://schemas.microsoft.com/office/drawing/2014/main" id="{6224E342-04FB-431E-A3B4-DCF83007F1BE}"/>
+                  <a16:creationId xmlns:a16="http://schemas.microsoft.com/office/drawing/2014/main" xmlns="" id="{6224E342-04FB-431E-A3B4-DCF83007F1BE}"/>
                 </a:ext>
               </a:extLst>
             </p:cNvPr>
@@ -6136,7 +6170,7 @@
             <p:cNvPr id="76" name="Picture 75">
               <a:extLst>
                 <a:ext uri="{FF2B5EF4-FFF2-40B4-BE49-F238E27FC236}">
-                  <a16:creationId xmlns:a16="http://schemas.microsoft.com/office/drawing/2014/main" id="{088EF5E7-45E0-4320-A8F8-522AD6D6F2DE}"/>
+                  <a16:creationId xmlns:a16="http://schemas.microsoft.com/office/drawing/2014/main" xmlns="" id="{088EF5E7-45E0-4320-A8F8-522AD6D6F2DE}"/>
                 </a:ext>
               </a:extLst>
             </p:cNvPr>
@@ -6177,7 +6211,7 @@
           <p:cNvPr id="81" name="Picture 80">
             <a:extLst>
               <a:ext uri="{FF2B5EF4-FFF2-40B4-BE49-F238E27FC236}">
-                <a16:creationId xmlns:a16="http://schemas.microsoft.com/office/drawing/2014/main" id="{632C71C2-A3DC-4674-82E6-F36D22CDF325}"/>
+                <a16:creationId xmlns:a16="http://schemas.microsoft.com/office/drawing/2014/main" xmlns="" id="{632C71C2-A3DC-4674-82E6-F36D22CDF325}"/>
               </a:ext>
             </a:extLst>
           </p:cNvPr>
@@ -6213,7 +6247,7 @@
           <p:cNvPr id="82" name="Rounded Rectangle 62">
             <a:extLst>
               <a:ext uri="{FF2B5EF4-FFF2-40B4-BE49-F238E27FC236}">
-                <a16:creationId xmlns:a16="http://schemas.microsoft.com/office/drawing/2014/main" id="{587678F1-E84F-4B79-9805-1B45E9B0CE6E}"/>
+                <a16:creationId xmlns:a16="http://schemas.microsoft.com/office/drawing/2014/main" xmlns="" id="{587678F1-E84F-4B79-9805-1B45E9B0CE6E}"/>
               </a:ext>
             </a:extLst>
           </p:cNvPr>
@@ -6275,7 +6309,7 @@
           <p:cNvPr id="86" name="Folded Corner 83">
             <a:extLst>
               <a:ext uri="{FF2B5EF4-FFF2-40B4-BE49-F238E27FC236}">
-                <a16:creationId xmlns:a16="http://schemas.microsoft.com/office/drawing/2014/main" id="{9FD6EDD9-5E0B-48B6-8FDE-8EED0AD7D0F0}"/>
+                <a16:creationId xmlns:a16="http://schemas.microsoft.com/office/drawing/2014/main" xmlns="" id="{9FD6EDD9-5E0B-48B6-8FDE-8EED0AD7D0F0}"/>
               </a:ext>
             </a:extLst>
           </p:cNvPr>
@@ -6329,7 +6363,7 @@
           <p:cNvPr id="87" name="TextBox 86">
             <a:extLst>
               <a:ext uri="{FF2B5EF4-FFF2-40B4-BE49-F238E27FC236}">
-                <a16:creationId xmlns:a16="http://schemas.microsoft.com/office/drawing/2014/main" id="{0CCD2D67-FDCA-4957-BAE2-4531C46CE536}"/>
+                <a16:creationId xmlns:a16="http://schemas.microsoft.com/office/drawing/2014/main" xmlns="" id="{0CCD2D67-FDCA-4957-BAE2-4531C46CE536}"/>
               </a:ext>
             </a:extLst>
           </p:cNvPr>
@@ -6369,7 +6403,7 @@
           <p:cNvPr id="88" name="TextBox 87">
             <a:extLst>
               <a:ext uri="{FF2B5EF4-FFF2-40B4-BE49-F238E27FC236}">
-                <a16:creationId xmlns:a16="http://schemas.microsoft.com/office/drawing/2014/main" id="{5BA8F07F-A02E-4E53-BDB6-FE235979FBE0}"/>
+                <a16:creationId xmlns:a16="http://schemas.microsoft.com/office/drawing/2014/main" xmlns="" id="{5BA8F07F-A02E-4E53-BDB6-FE235979FBE0}"/>
               </a:ext>
             </a:extLst>
           </p:cNvPr>
@@ -6378,8 +6412,8 @@
         </p:nvSpPr>
         <p:spPr>
           <a:xfrm>
-            <a:off x="8626734" y="1307128"/>
-            <a:ext cx="1195399" cy="584775"/>
+            <a:off x="8621975" y="1188574"/>
+            <a:ext cx="1195399" cy="830997"/>
           </a:xfrm>
           <a:prstGeom prst="rect">
             <a:avLst/>
@@ -6393,13 +6427,32 @@
           <a:lstStyle/>
           <a:p>
             <a:pPr algn="ctr"/>
+            <a:r>
+              <a:rPr lang="en-US" sz="1600" dirty="0" smtClean="0">
+                <a:latin typeface="Source Sans Pro" charset="0"/>
+                <a:ea typeface="Source Sans Pro" charset="0"/>
+                <a:cs typeface="Source Sans Pro" charset="0"/>
+              </a:rPr>
+              <a:t>Sandboxed</a:t>
+            </a:r>
+          </a:p>
+          <a:p>
+            <a:pPr algn="ctr"/>
+            <a:r>
+              <a:rPr lang="en-US" sz="1600" dirty="0" smtClean="0">
+                <a:latin typeface="Source Sans Pro" charset="0"/>
+                <a:ea typeface="Source Sans Pro" charset="0"/>
+                <a:cs typeface="Source Sans Pro" charset="0"/>
+              </a:rPr>
+              <a:t>Application </a:t>
+            </a:r>
             <a:r>
               <a:rPr lang="en-US" sz="1600" dirty="0">
                 <a:latin typeface="Source Sans Pro" charset="0"/>
                 <a:ea typeface="Source Sans Pro" charset="0"/>
                 <a:cs typeface="Source Sans Pro" charset="0"/>
               </a:rPr>
-              <a:t>Application </a:t>
+              <a:t/>
             </a:r>
             <a:br>
               <a:rPr lang="en-US" sz="1600" dirty="0">
@@ -6429,6 +6482,13 @@
   <p:clrMapOvr>
     <a:masterClrMapping/>
   </p:clrMapOvr>
+  <p:timing>
+    <p:tnLst>
+      <p:par>
+        <p:cTn id="1" dur="indefinite" restart="never" nodeType="tmRoot"/>
+      </p:par>
+    </p:tnLst>
+  </p:timing>
 </p:sld>
 </file>
 

</xml_diff>